<commit_message>
Update pptx, Finale Version 7.0
</commit_message>
<xml_diff>
--- a/docs/FEUSI – The Game.pptx
+++ b/docs/FEUSI – The Game.pptx
@@ -5,23 +5,24 @@
     <p:sldMasterId id="2147483658" r:id="rId4"/>
   </p:sldMasterIdLst>
   <p:notesMasterIdLst>
-    <p:notesMasterId r:id="rId16"/>
+    <p:notesMasterId r:id="rId17"/>
   </p:notesMasterIdLst>
   <p:handoutMasterIdLst>
-    <p:handoutMasterId r:id="rId17"/>
+    <p:handoutMasterId r:id="rId18"/>
   </p:handoutMasterIdLst>
   <p:sldIdLst>
     <p:sldId id="410" r:id="rId5"/>
     <p:sldId id="383" r:id="rId6"/>
     <p:sldId id="391" r:id="rId7"/>
     <p:sldId id="412" r:id="rId8"/>
-    <p:sldId id="408" r:id="rId9"/>
-    <p:sldId id="411" r:id="rId10"/>
-    <p:sldId id="407" r:id="rId11"/>
-    <p:sldId id="413" r:id="rId12"/>
-    <p:sldId id="414" r:id="rId13"/>
-    <p:sldId id="404" r:id="rId14"/>
-    <p:sldId id="398" r:id="rId15"/>
+    <p:sldId id="415" r:id="rId9"/>
+    <p:sldId id="408" r:id="rId10"/>
+    <p:sldId id="411" r:id="rId11"/>
+    <p:sldId id="407" r:id="rId12"/>
+    <p:sldId id="413" r:id="rId13"/>
+    <p:sldId id="414" r:id="rId14"/>
+    <p:sldId id="404" r:id="rId15"/>
+    <p:sldId id="398" r:id="rId16"/>
   </p:sldIdLst>
   <p:sldSz cx="12192000" cy="6858000"/>
   <p:notesSz cx="6858000" cy="9144000"/>
@@ -201,7 +202,7 @@
             <a:pPr rtl="0"/>
             <a:fld id="{26024186-F834-475C-87E8-2BDD0E0CD34D}" type="datetime1">
               <a:rPr lang="de-DE" smtClean="0"/>
-              <a:t>25.04.2025</a:t>
+              <a:t>26.04.2025</a:t>
             </a:fld>
             <a:endParaRPr lang="de-DE" dirty="0"/>
           </a:p>
@@ -420,7 +421,7 @@
             <a:fld id="{92C0A1D8-3EBE-454B-B392-E1E4A1635681}" type="datetime1">
               <a:rPr lang="de-DE" smtClean="0"/>
               <a:pPr/>
-              <a:t>25.04.2025</a:t>
+              <a:t>26.04.2025</a:t>
             </a:fld>
             <a:endParaRPr lang="de-DE" dirty="0"/>
           </a:p>
@@ -867,7 +868,7 @@
             <a:pPr rtl="0"/>
             <a:fld id="{A89C7E07-3C67-C64C-8DA0-0404F6303970}" type="slidenum">
               <a:rPr lang="de-DE" smtClean="0"/>
-              <a:t>11</a:t>
+              <a:t>12</a:t>
             </a:fld>
             <a:endParaRPr lang="de-DE" dirty="0"/>
           </a:p>
@@ -1149,7 +1150,7 @@
             <a:pPr rtl="0"/>
             <a:fld id="{A89C7E07-3C67-C64C-8DA0-0404F6303970}" type="slidenum">
               <a:rPr lang="de-DE" smtClean="0"/>
-              <a:t>5</a:t>
+              <a:t>6</a:t>
             </a:fld>
             <a:endParaRPr lang="de-DE" dirty="0"/>
           </a:p>
@@ -1243,7 +1244,7 @@
             <a:pPr rtl="0"/>
             <a:fld id="{A89C7E07-3C67-C64C-8DA0-0404F6303970}" type="slidenum">
               <a:rPr lang="de-DE" smtClean="0"/>
-              <a:t>6</a:t>
+              <a:t>7</a:t>
             </a:fld>
             <a:endParaRPr lang="de-DE" dirty="0"/>
           </a:p>
@@ -2218,7 +2219,7 @@
             <a:pPr rtl="0"/>
             <a:fld id="{A89C7E07-3C67-C64C-8DA0-0404F6303970}" type="slidenum">
               <a:rPr lang="de-DE" smtClean="0"/>
-              <a:t>7</a:t>
+              <a:t>8</a:t>
             </a:fld>
             <a:endParaRPr lang="de-DE" dirty="0"/>
           </a:p>
@@ -2493,7 +2494,7 @@
             <a:pPr rtl="0"/>
             <a:fld id="{A89C7E07-3C67-C64C-8DA0-0404F6303970}" type="slidenum">
               <a:rPr lang="de-DE" smtClean="0"/>
-              <a:t>8</a:t>
+              <a:t>9</a:t>
             </a:fld>
             <a:endParaRPr lang="de-DE" dirty="0"/>
           </a:p>
@@ -3218,7 +3219,7 @@
             <a:pPr rtl="0"/>
             <a:fld id="{A89C7E07-3C67-C64C-8DA0-0404F6303970}" type="slidenum">
               <a:rPr lang="de-DE" smtClean="0"/>
-              <a:t>9</a:t>
+              <a:t>10</a:t>
             </a:fld>
             <a:endParaRPr lang="de-DE" dirty="0"/>
           </a:p>
@@ -3312,7 +3313,7 @@
             <a:pPr rtl="0"/>
             <a:fld id="{A89C7E07-3C67-C64C-8DA0-0404F6303970}" type="slidenum">
               <a:rPr lang="de-DE" smtClean="0"/>
-              <a:t>10</a:t>
+              <a:t>11</a:t>
             </a:fld>
             <a:endParaRPr lang="de-DE" dirty="0"/>
           </a:p>
@@ -11987,6 +11988,467 @@
           <p:cNvPr id="2" name="Titel 1">
             <a:extLst>
               <a:ext uri="{FF2B5EF4-FFF2-40B4-BE49-F238E27FC236}">
+                <a16:creationId xmlns:a16="http://schemas.microsoft.com/office/drawing/2014/main" id="{9014DB0E-06FC-4867-2980-06B8D2A7B370}"/>
+              </a:ext>
+            </a:extLst>
+          </p:cNvPr>
+          <p:cNvSpPr>
+            <a:spLocks noGrp="1"/>
+          </p:cNvSpPr>
+          <p:nvPr>
+            <p:ph type="title"/>
+          </p:nvPr>
+        </p:nvSpPr>
+        <p:spPr/>
+        <p:txBody>
+          <a:bodyPr/>
+          <a:lstStyle/>
+          <a:p>
+            <a:r>
+              <a:rPr lang="de-CH" dirty="0"/>
+              <a:t>Codeeinblick</a:t>
+            </a:r>
+          </a:p>
+        </p:txBody>
+      </p:sp>
+      <p:sp>
+        <p:nvSpPr>
+          <p:cNvPr id="4" name="Inhaltsplatzhalter 3">
+            <a:extLst>
+              <a:ext uri="{FF2B5EF4-FFF2-40B4-BE49-F238E27FC236}">
+                <a16:creationId xmlns:a16="http://schemas.microsoft.com/office/drawing/2014/main" id="{165A2B93-BEEA-466A-20FD-7A4A442F3A83}"/>
+              </a:ext>
+            </a:extLst>
+          </p:cNvPr>
+          <p:cNvSpPr>
+            <a:spLocks noGrp="1"/>
+          </p:cNvSpPr>
+          <p:nvPr>
+            <p:ph sz="quarter" idx="14"/>
+          </p:nvPr>
+        </p:nvSpPr>
+        <p:spPr>
+          <a:xfrm>
+            <a:off x="3451860" y="1772725"/>
+            <a:ext cx="5676900" cy="3597470"/>
+          </a:xfrm>
+        </p:spPr>
+        <p:txBody>
+          <a:bodyPr>
+            <a:normAutofit/>
+          </a:bodyPr>
+          <a:lstStyle/>
+          <a:p>
+            <a:pPr marL="0" indent="0">
+              <a:buNone/>
+            </a:pPr>
+            <a:r>
+              <a:rPr lang="de-CH" sz="2800" b="1" dirty="0"/>
+              <a:t>Rätsel-Aufbereitung &amp; Rückgabe </a:t>
+            </a:r>
+          </a:p>
+        </p:txBody>
+      </p:sp>
+      <p:sp>
+        <p:nvSpPr>
+          <p:cNvPr id="11" name="Textfeld 10">
+            <a:extLst>
+              <a:ext uri="{FF2B5EF4-FFF2-40B4-BE49-F238E27FC236}">
+                <a16:creationId xmlns:a16="http://schemas.microsoft.com/office/drawing/2014/main" id="{33EEDF6A-8FB7-3E15-ACE7-660A306B6656}"/>
+              </a:ext>
+            </a:extLst>
+          </p:cNvPr>
+          <p:cNvSpPr txBox="1"/>
+          <p:nvPr/>
+        </p:nvSpPr>
+        <p:spPr>
+          <a:xfrm>
+            <a:off x="6849009" y="2587779"/>
+            <a:ext cx="4358640" cy="3770263"/>
+          </a:xfrm>
+          <a:prstGeom prst="rect">
+            <a:avLst/>
+          </a:prstGeom>
+          <a:noFill/>
+        </p:spPr>
+        <p:txBody>
+          <a:bodyPr wrap="square" rtlCol="0">
+            <a:spAutoFit/>
+          </a:bodyPr>
+          <a:lstStyle/>
+          <a:p>
+            <a:pPr marL="0" marR="0" lvl="0" indent="0" algn="l" defTabSz="914400" rtl="0" eaLnBrk="0" fontAlgn="base" latinLnBrk="0" hangingPunct="0">
+              <a:lnSpc>
+                <a:spcPct val="100000"/>
+              </a:lnSpc>
+              <a:spcBef>
+                <a:spcPct val="0"/>
+              </a:spcBef>
+              <a:spcAft>
+                <a:spcPct val="0"/>
+              </a:spcAft>
+              <a:buClrTx/>
+              <a:buSzTx/>
+              <a:tabLst/>
+            </a:pPr>
+            <a:r>
+              <a:rPr kumimoji="0" lang="de-DE" altLang="de-DE" sz="1500" b="1" i="0" u="none" strike="noStrike" cap="none" normalizeH="0" baseline="0" dirty="0">
+                <a:ln>
+                  <a:noFill/>
+                </a:ln>
+                <a:solidFill>
+                  <a:schemeClr val="bg1"/>
+                </a:solidFill>
+                <a:effectLst/>
+                <a:latin typeface="Arial" panose="020B0604020202020204" pitchFamily="34" charset="0"/>
+              </a:rPr>
+              <a:t>Klarheit &amp; Wartbarkeit</a:t>
+            </a:r>
+            <a:r>
+              <a:rPr kumimoji="0" lang="de-DE" altLang="de-DE" sz="1500" b="0" i="0" u="none" strike="noStrike" cap="none" normalizeH="0" baseline="0" dirty="0">
+                <a:ln>
+                  <a:noFill/>
+                </a:ln>
+                <a:solidFill>
+                  <a:schemeClr val="bg1"/>
+                </a:solidFill>
+                <a:effectLst/>
+                <a:latin typeface="Arial" panose="020B0604020202020204" pitchFamily="34" charset="0"/>
+              </a:rPr>
+              <a:t>: Jede Rätsel-Kategorie wird separat und eindeutig behandelt – neue Typen lassen sich so einfach ergänzen.</a:t>
+            </a:r>
+            <a:br>
+              <a:rPr kumimoji="0" lang="de-DE" altLang="de-DE" sz="1500" b="0" i="0" u="none" strike="noStrike" cap="none" normalizeH="0" baseline="0" dirty="0">
+                <a:ln>
+                  <a:noFill/>
+                </a:ln>
+                <a:solidFill>
+                  <a:schemeClr val="bg1"/>
+                </a:solidFill>
+                <a:effectLst/>
+                <a:latin typeface="Arial" panose="020B0604020202020204" pitchFamily="34" charset="0"/>
+              </a:rPr>
+            </a:br>
+            <a:endParaRPr kumimoji="0" lang="de-DE" altLang="de-DE" sz="1500" b="0" i="0" u="none" strike="noStrike" cap="none" normalizeH="0" baseline="0" dirty="0">
+              <a:ln>
+                <a:noFill/>
+              </a:ln>
+              <a:solidFill>
+                <a:schemeClr val="bg1"/>
+              </a:solidFill>
+              <a:effectLst/>
+              <a:latin typeface="Arial" panose="020B0604020202020204" pitchFamily="34" charset="0"/>
+            </a:endParaRPr>
+          </a:p>
+          <a:p>
+            <a:pPr marL="0" marR="0" lvl="0" indent="0" algn="l" defTabSz="914400" rtl="0" eaLnBrk="0" fontAlgn="base" latinLnBrk="0" hangingPunct="0">
+              <a:lnSpc>
+                <a:spcPct val="100000"/>
+              </a:lnSpc>
+              <a:spcBef>
+                <a:spcPct val="0"/>
+              </a:spcBef>
+              <a:spcAft>
+                <a:spcPct val="0"/>
+              </a:spcAft>
+              <a:buClrTx/>
+              <a:buSzTx/>
+              <a:tabLst/>
+            </a:pPr>
+            <a:r>
+              <a:rPr kumimoji="0" lang="de-DE" altLang="de-DE" sz="1500" b="1" i="0" u="none" strike="noStrike" cap="none" normalizeH="0" baseline="0" dirty="0">
+                <a:ln>
+                  <a:noFill/>
+                </a:ln>
+                <a:solidFill>
+                  <a:schemeClr val="bg1"/>
+                </a:solidFill>
+                <a:effectLst/>
+                <a:latin typeface="Arial" panose="020B0604020202020204" pitchFamily="34" charset="0"/>
+              </a:rPr>
+              <a:t>Robustheit</a:t>
+            </a:r>
+            <a:r>
+              <a:rPr kumimoji="0" lang="de-DE" altLang="de-DE" sz="1500" b="0" i="0" u="none" strike="noStrike" cap="none" normalizeH="0" baseline="0" dirty="0">
+                <a:ln>
+                  <a:noFill/>
+                </a:ln>
+                <a:solidFill>
+                  <a:schemeClr val="bg1"/>
+                </a:solidFill>
+                <a:effectLst/>
+                <a:latin typeface="Arial" panose="020B0604020202020204" pitchFamily="34" charset="0"/>
+              </a:rPr>
+              <a:t>: Fehlende oder unbekannte Typen führen nicht zu Abstürzen, sondern landen im </a:t>
+            </a:r>
+            <a:r>
+              <a:rPr kumimoji="0" lang="de-DE" altLang="de-DE" sz="1500" b="0" i="0" u="none" strike="noStrike" cap="none" normalizeH="0" baseline="0" dirty="0" err="1">
+                <a:ln>
+                  <a:noFill/>
+                </a:ln>
+                <a:solidFill>
+                  <a:schemeClr val="bg1"/>
+                </a:solidFill>
+                <a:effectLst/>
+                <a:latin typeface="Arial" panose="020B0604020202020204" pitchFamily="34" charset="0"/>
+              </a:rPr>
+              <a:t>Fallback</a:t>
+            </a:r>
+            <a:r>
+              <a:rPr kumimoji="0" lang="de-DE" altLang="de-DE" sz="1500" b="0" i="0" u="none" strike="noStrike" cap="none" normalizeH="0" baseline="0" dirty="0">
+                <a:ln>
+                  <a:noFill/>
+                </a:ln>
+                <a:solidFill>
+                  <a:schemeClr val="bg1"/>
+                </a:solidFill>
+                <a:effectLst/>
+                <a:latin typeface="Arial" panose="020B0604020202020204" pitchFamily="34" charset="0"/>
+              </a:rPr>
+              <a:t>.</a:t>
+            </a:r>
+          </a:p>
+          <a:p>
+            <a:pPr marL="0" marR="0" lvl="0" indent="0" algn="l" defTabSz="914400" rtl="0" eaLnBrk="0" fontAlgn="base" latinLnBrk="0" hangingPunct="0">
+              <a:lnSpc>
+                <a:spcPct val="100000"/>
+              </a:lnSpc>
+              <a:spcBef>
+                <a:spcPct val="0"/>
+              </a:spcBef>
+              <a:spcAft>
+                <a:spcPct val="0"/>
+              </a:spcAft>
+              <a:buClrTx/>
+              <a:buSzTx/>
+              <a:tabLst/>
+            </a:pPr>
+            <a:endParaRPr kumimoji="0" lang="de-DE" altLang="de-DE" sz="1500" b="1" i="0" u="none" strike="noStrike" cap="none" normalizeH="0" baseline="0" dirty="0">
+              <a:ln>
+                <a:noFill/>
+              </a:ln>
+              <a:solidFill>
+                <a:schemeClr val="bg1"/>
+              </a:solidFill>
+              <a:effectLst/>
+              <a:latin typeface="Arial" panose="020B0604020202020204" pitchFamily="34" charset="0"/>
+            </a:endParaRPr>
+          </a:p>
+          <a:p>
+            <a:pPr marL="0" marR="0" lvl="0" indent="0" algn="l" defTabSz="914400" rtl="0" eaLnBrk="0" fontAlgn="base" latinLnBrk="0" hangingPunct="0">
+              <a:lnSpc>
+                <a:spcPct val="100000"/>
+              </a:lnSpc>
+              <a:spcBef>
+                <a:spcPct val="0"/>
+              </a:spcBef>
+              <a:spcAft>
+                <a:spcPct val="0"/>
+              </a:spcAft>
+              <a:buClrTx/>
+              <a:buSzTx/>
+              <a:tabLst/>
+            </a:pPr>
+            <a:r>
+              <a:rPr kumimoji="0" lang="de-DE" altLang="de-DE" sz="1500" b="1" i="0" u="none" strike="noStrike" cap="none" normalizeH="0" baseline="0" dirty="0">
+                <a:ln>
+                  <a:noFill/>
+                </a:ln>
+                <a:solidFill>
+                  <a:schemeClr val="bg1"/>
+                </a:solidFill>
+                <a:effectLst/>
+                <a:latin typeface="Arial" panose="020B0604020202020204" pitchFamily="34" charset="0"/>
+              </a:rPr>
+              <a:t>Spielerfahrung</a:t>
+            </a:r>
+            <a:r>
+              <a:rPr kumimoji="0" lang="de-DE" altLang="de-DE" sz="1500" b="0" i="0" u="none" strike="noStrike" cap="none" normalizeH="0" baseline="0" dirty="0">
+                <a:ln>
+                  <a:noFill/>
+                </a:ln>
+                <a:solidFill>
+                  <a:schemeClr val="bg1"/>
+                </a:solidFill>
+                <a:effectLst/>
+                <a:latin typeface="Arial" panose="020B0604020202020204" pitchFamily="34" charset="0"/>
+              </a:rPr>
+              <a:t>: Einheitliches Format für Frage, Antwort und Tipp garantiert konsistente Anzeige im Terminal und vermeidet Verwirrung.</a:t>
+            </a:r>
+          </a:p>
+          <a:p>
+            <a:pPr marL="0" marR="0" lvl="0" indent="0" algn="l" defTabSz="914400" rtl="0" eaLnBrk="0" fontAlgn="base" latinLnBrk="0" hangingPunct="0">
+              <a:lnSpc>
+                <a:spcPct val="100000"/>
+              </a:lnSpc>
+              <a:spcBef>
+                <a:spcPct val="0"/>
+              </a:spcBef>
+              <a:spcAft>
+                <a:spcPct val="0"/>
+              </a:spcAft>
+              <a:buClrTx/>
+              <a:buSzTx/>
+              <a:tabLst/>
+            </a:pPr>
+            <a:endParaRPr kumimoji="0" lang="de-DE" altLang="de-DE" sz="1500" b="1" i="0" u="none" strike="noStrike" cap="none" normalizeH="0" baseline="0" dirty="0">
+              <a:ln>
+                <a:noFill/>
+              </a:ln>
+              <a:solidFill>
+                <a:schemeClr val="bg1"/>
+              </a:solidFill>
+              <a:effectLst/>
+              <a:latin typeface="Arial" panose="020B0604020202020204" pitchFamily="34" charset="0"/>
+            </a:endParaRPr>
+          </a:p>
+          <a:p>
+            <a:pPr marL="0" marR="0" lvl="0" indent="0" algn="l" defTabSz="914400" rtl="0" eaLnBrk="0" fontAlgn="base" latinLnBrk="0" hangingPunct="0">
+              <a:lnSpc>
+                <a:spcPct val="100000"/>
+              </a:lnSpc>
+              <a:spcBef>
+                <a:spcPct val="0"/>
+              </a:spcBef>
+              <a:spcAft>
+                <a:spcPct val="0"/>
+              </a:spcAft>
+              <a:buClrTx/>
+              <a:buSzTx/>
+              <a:tabLst/>
+            </a:pPr>
+            <a:r>
+              <a:rPr kumimoji="0" lang="de-DE" altLang="de-DE" sz="1500" b="1" i="0" u="none" strike="noStrike" cap="none" normalizeH="0" baseline="0" dirty="0">
+                <a:ln>
+                  <a:noFill/>
+                </a:ln>
+                <a:solidFill>
+                  <a:schemeClr val="bg1"/>
+                </a:solidFill>
+                <a:effectLst/>
+                <a:latin typeface="Arial" panose="020B0604020202020204" pitchFamily="34" charset="0"/>
+              </a:rPr>
+              <a:t>Erweiterbarkeit</a:t>
+            </a:r>
+            <a:r>
+              <a:rPr kumimoji="0" lang="de-DE" altLang="de-DE" sz="1500" b="0" i="0" u="none" strike="noStrike" cap="none" normalizeH="0" baseline="0" dirty="0">
+                <a:ln>
+                  <a:noFill/>
+                </a:ln>
+                <a:solidFill>
+                  <a:schemeClr val="bg1"/>
+                </a:solidFill>
+                <a:effectLst/>
+                <a:latin typeface="Arial" panose="020B0604020202020204" pitchFamily="34" charset="0"/>
+              </a:rPr>
+              <a:t>: Zusätzliche Rätsel-Typen können einfach über neue </a:t>
+            </a:r>
+            <a:r>
+              <a:rPr kumimoji="0" lang="de-DE" altLang="de-DE" sz="1500" b="0" i="0" u="none" strike="noStrike" cap="none" normalizeH="0" baseline="0" dirty="0" err="1">
+                <a:ln>
+                  <a:noFill/>
+                </a:ln>
+                <a:solidFill>
+                  <a:schemeClr val="bg1"/>
+                </a:solidFill>
+                <a:effectLst/>
+                <a:latin typeface="Arial Unicode MS"/>
+              </a:rPr>
+              <a:t>elif</a:t>
+            </a:r>
+            <a:r>
+              <a:rPr kumimoji="0" lang="de-DE" altLang="de-DE" sz="1500" b="0" i="0" u="none" strike="noStrike" cap="none" normalizeH="0" baseline="0" dirty="0">
+                <a:ln>
+                  <a:noFill/>
+                </a:ln>
+                <a:solidFill>
+                  <a:schemeClr val="bg1"/>
+                </a:solidFill>
+                <a:effectLst/>
+              </a:rPr>
+              <a:t>-Blöcke ergänzt werden, ohne bestehende Logik zu ändern.</a:t>
+            </a:r>
+            <a:endParaRPr kumimoji="0" lang="de-DE" altLang="de-DE" sz="1500" b="0" i="0" u="none" strike="noStrike" cap="none" normalizeH="0" baseline="0" dirty="0">
+              <a:ln>
+                <a:noFill/>
+              </a:ln>
+              <a:solidFill>
+                <a:schemeClr val="bg1"/>
+              </a:solidFill>
+              <a:effectLst/>
+              <a:latin typeface="Arial" panose="020B0604020202020204" pitchFamily="34" charset="0"/>
+            </a:endParaRPr>
+          </a:p>
+          <a:p>
+            <a:endParaRPr lang="de-CH" sz="1400" dirty="0"/>
+          </a:p>
+        </p:txBody>
+      </p:sp>
+      <p:pic>
+        <p:nvPicPr>
+          <p:cNvPr id="5" name="Grafik 4">
+            <a:extLst>
+              <a:ext uri="{FF2B5EF4-FFF2-40B4-BE49-F238E27FC236}">
+                <a16:creationId xmlns:a16="http://schemas.microsoft.com/office/drawing/2014/main" id="{684FC139-B889-19BA-F299-AEFFF7550D7B}"/>
+              </a:ext>
+            </a:extLst>
+          </p:cNvPr>
+          <p:cNvPicPr>
+            <a:picLocks noChangeAspect="1"/>
+          </p:cNvPicPr>
+          <p:nvPr/>
+        </p:nvPicPr>
+        <p:blipFill>
+          <a:blip r:embed="rId3"/>
+          <a:stretch>
+            <a:fillRect/>
+          </a:stretch>
+        </p:blipFill>
+        <p:spPr>
+          <a:xfrm>
+            <a:off x="572928" y="2626252"/>
+            <a:ext cx="5757864" cy="3693319"/>
+          </a:xfrm>
+          <a:prstGeom prst="rect">
+            <a:avLst/>
+          </a:prstGeom>
+        </p:spPr>
+      </p:pic>
+    </p:spTree>
+    <p:extLst>
+      <p:ext uri="{BB962C8B-B14F-4D97-AF65-F5344CB8AC3E}">
+        <p14:creationId xmlns:p14="http://schemas.microsoft.com/office/powerpoint/2010/main" val="93615151"/>
+      </p:ext>
+    </p:extLst>
+  </p:cSld>
+  <p:clrMapOvr>
+    <a:masterClrMapping/>
+  </p:clrMapOvr>
+</p:sld>
+</file>
+
+<file path=ppt/slides/slide11.xml><?xml version="1.0" encoding="utf-8"?>
+<p:sld xmlns:a="http://schemas.openxmlformats.org/drawingml/2006/main" xmlns:r="http://schemas.openxmlformats.org/officeDocument/2006/relationships" xmlns:p="http://schemas.openxmlformats.org/presentationml/2006/main">
+  <p:cSld>
+    <p:spTree>
+      <p:nvGrpSpPr>
+        <p:cNvPr id="1" name=""/>
+        <p:cNvGrpSpPr/>
+        <p:nvPr/>
+      </p:nvGrpSpPr>
+      <p:grpSpPr>
+        <a:xfrm>
+          <a:off x="0" y="0"/>
+          <a:ext cx="0" cy="0"/>
+          <a:chOff x="0" y="0"/>
+          <a:chExt cx="0" cy="0"/>
+        </a:xfrm>
+      </p:grpSpPr>
+      <p:sp>
+        <p:nvSpPr>
+          <p:cNvPr id="2" name="Titel 1">
+            <a:extLst>
+              <a:ext uri="{FF2B5EF4-FFF2-40B4-BE49-F238E27FC236}">
                 <a16:creationId xmlns:a16="http://schemas.microsoft.com/office/drawing/2014/main" id="{F0759DC4-8B30-98A0-5BAB-C78BA4A4AD55}"/>
               </a:ext>
             </a:extLst>
@@ -12033,7 +12495,7 @@
 </p:sld>
 </file>
 
-<file path=ppt/slides/slide11.xml><?xml version="1.0" encoding="utf-8"?>
+<file path=ppt/slides/slide12.xml><?xml version="1.0" encoding="utf-8"?>
 <p:sld xmlns:a="http://schemas.openxmlformats.org/drawingml/2006/main" xmlns:r="http://schemas.openxmlformats.org/officeDocument/2006/relationships" xmlns:p="http://schemas.openxmlformats.org/presentationml/2006/main">
   <p:cSld>
     <p:spTree>
@@ -12704,7 +13166,7 @@
             </a:pPr>
             <a:r>
               <a:rPr lang="de-DE" dirty="0"/>
-              <a:t>Das Projekt **PEUSI - The Game** ist ein interaktives Spiel. Sie betreten ein fiktives Terminal, in dem sie verschiedenste Rätsel lösen müssen – von Arithmetik und Binäraufgaben bis hin zu Wortspielen, Logikrätseln und Allgemeinwissen. </a:t>
+              <a:t>Das Projekt **PEUSI - The Game** ist ein interaktives Spiel. Die Spieler betreten ein fiktives Terminal, in dem sie verschiedenste Rätsel lösen müssen – von Arithmetik und Binäraufgaben bis hin zu Wortspielen, Logikrätseln und Allgemeinwissen. </a:t>
             </a:r>
           </a:p>
           <a:p>
@@ -12879,7 +13341,7 @@
         </p:spPr>
         <p:txBody>
           <a:bodyPr>
-            <a:normAutofit lnSpcReduction="10000"/>
+            <a:normAutofit/>
           </a:bodyPr>
           <a:lstStyle/>
           <a:p>
@@ -12887,17 +13349,8 @@
               <a:buNone/>
             </a:pPr>
             <a:r>
-              <a:rPr lang="de-CH" b="1" dirty="0"/>
-              <a:t>Minimalziel</a:t>
-            </a:r>
-          </a:p>
-          <a:p>
-            <a:pPr marL="0" indent="0">
-              <a:buNone/>
-            </a:pPr>
-            <a:r>
               <a:rPr lang="de-DE" dirty="0"/>
-              <a:t>Das Minimalziel besteht in der Entwicklung eines funktionsfähigen Prototyps, der folgende Kernfunktionen bietet:</a:t>
+              <a:t>Das Minimalziel bestand in der Entwicklung eines funktionsfähigen Prototyps, der folgende Kernfunktionen bietet:</a:t>
             </a:r>
           </a:p>
           <a:p>
@@ -12921,7 +13374,7 @@
           <a:p>
             <a:r>
               <a:rPr lang="de-DE" dirty="0"/>
-              <a:t>Terminal-Interface: Darstellung eines authentischen Hacker-Terminals zur Interaktion.</a:t>
+              <a:t>Terminal-Interface: Darstellung eines authentischen Terminals zur Interaktion.</a:t>
             </a:r>
             <a:endParaRPr lang="de-CH" dirty="0"/>
           </a:p>
@@ -12962,6 +13415,134 @@
           <p:cNvPr id="2" name="Titel 1">
             <a:extLst>
               <a:ext uri="{FF2B5EF4-FFF2-40B4-BE49-F238E27FC236}">
+                <a16:creationId xmlns:a16="http://schemas.microsoft.com/office/drawing/2014/main" id="{6ABF456D-65A2-8C94-8840-D4E562BEAE9F}"/>
+              </a:ext>
+            </a:extLst>
+          </p:cNvPr>
+          <p:cNvSpPr>
+            <a:spLocks noGrp="1"/>
+          </p:cNvSpPr>
+          <p:nvPr>
+            <p:ph type="title"/>
+          </p:nvPr>
+        </p:nvSpPr>
+        <p:spPr/>
+        <p:txBody>
+          <a:bodyPr/>
+          <a:lstStyle/>
+          <a:p>
+            <a:r>
+              <a:rPr lang="de-CH" dirty="0"/>
+              <a:t>Erweiterte Ziele</a:t>
+            </a:r>
+          </a:p>
+        </p:txBody>
+      </p:sp>
+      <p:sp>
+        <p:nvSpPr>
+          <p:cNvPr id="3" name="Inhaltsplatzhalter 2">
+            <a:extLst>
+              <a:ext uri="{FF2B5EF4-FFF2-40B4-BE49-F238E27FC236}">
+                <a16:creationId xmlns:a16="http://schemas.microsoft.com/office/drawing/2014/main" id="{34C9B317-1453-A394-F102-EA3F3464412D}"/>
+              </a:ext>
+            </a:extLst>
+          </p:cNvPr>
+          <p:cNvSpPr>
+            <a:spLocks noGrp="1"/>
+          </p:cNvSpPr>
+          <p:nvPr>
+            <p:ph sz="quarter" idx="13"/>
+          </p:nvPr>
+        </p:nvSpPr>
+        <p:spPr>
+          <a:xfrm>
+            <a:off x="2446020" y="2403928"/>
+            <a:ext cx="9204960" cy="3699328"/>
+          </a:xfrm>
+        </p:spPr>
+        <p:txBody>
+          <a:bodyPr>
+            <a:normAutofit/>
+          </a:bodyPr>
+          <a:lstStyle/>
+          <a:p>
+            <a:r>
+              <a:rPr lang="de-DE" b="1" dirty="0"/>
+              <a:t>Zusätzliche Rätseltypen: </a:t>
+            </a:r>
+            <a:r>
+              <a:rPr lang="de-DE" dirty="0"/>
+              <a:t>Erweiterung des bestehenden Rätselangebots um neue Kategorien und Schwierigkeitsgrade.</a:t>
+            </a:r>
+          </a:p>
+          <a:p>
+            <a:r>
+              <a:rPr lang="de-DE" b="1" dirty="0"/>
+              <a:t>Soundeffekte und visuelle Optimierungen</a:t>
+            </a:r>
+            <a:r>
+              <a:rPr lang="de-DE" dirty="0"/>
+              <a:t>: Integration von Audio-Feedback sowie eine benutzerfreundlichere und optisch ansprechendere Oberfläche.$</a:t>
+            </a:r>
+          </a:p>
+          <a:p>
+            <a:r>
+              <a:rPr lang="de-DE" b="1" dirty="0"/>
+              <a:t>Level-Design: </a:t>
+            </a:r>
+            <a:r>
+              <a:rPr lang="de-DE" dirty="0"/>
+              <a:t>Entwicklung eines durchgängigen Narrativs und reibungsloser Übergänge zwischen den Levels.</a:t>
+            </a:r>
+          </a:p>
+          <a:p>
+            <a:r>
+              <a:rPr lang="de-DE" b="1" dirty="0"/>
+              <a:t>Erweiterbarkeit: </a:t>
+            </a:r>
+            <a:r>
+              <a:rPr lang="de-DE" dirty="0"/>
+              <a:t>Schaffung einer flexiblen Architektur, die zukünftige Erweiterungen und Anpassungen einfach ermöglicht.</a:t>
+            </a:r>
+            <a:endParaRPr lang="de-CH" dirty="0"/>
+          </a:p>
+        </p:txBody>
+      </p:sp>
+    </p:spTree>
+    <p:extLst>
+      <p:ext uri="{BB962C8B-B14F-4D97-AF65-F5344CB8AC3E}">
+        <p14:creationId xmlns:p14="http://schemas.microsoft.com/office/powerpoint/2010/main" val="2962156367"/>
+      </p:ext>
+    </p:extLst>
+  </p:cSld>
+  <p:clrMapOvr>
+    <a:masterClrMapping/>
+  </p:clrMapOvr>
+</p:sld>
+</file>
+
+<file path=ppt/slides/slide6.xml><?xml version="1.0" encoding="utf-8"?>
+<p:sld xmlns:a="http://schemas.openxmlformats.org/drawingml/2006/main" xmlns:r="http://schemas.openxmlformats.org/officeDocument/2006/relationships" xmlns:p="http://schemas.openxmlformats.org/presentationml/2006/main">
+  <p:cSld>
+    <p:spTree>
+      <p:nvGrpSpPr>
+        <p:cNvPr id="1" name=""/>
+        <p:cNvGrpSpPr/>
+        <p:nvPr/>
+      </p:nvGrpSpPr>
+      <p:grpSpPr>
+        <a:xfrm>
+          <a:off x="0" y="0"/>
+          <a:ext cx="0" cy="0"/>
+          <a:chOff x="0" y="0"/>
+          <a:chExt cx="0" cy="0"/>
+        </a:xfrm>
+      </p:grpSpPr>
+      <p:sp>
+        <p:nvSpPr>
+          <p:cNvPr id="2" name="Titel 1">
+            <a:extLst>
+              <a:ext uri="{FF2B5EF4-FFF2-40B4-BE49-F238E27FC236}">
                 <a16:creationId xmlns:a16="http://schemas.microsoft.com/office/drawing/2014/main" id="{805346ED-721D-85EE-2F1B-A31D0912DE29}"/>
               </a:ext>
             </a:extLst>
@@ -13055,15 +13636,6 @@
               <a:srgbClr val="C0C0C0"/>
             </a:contourClr>
           </a:sp3d>
-          <a:extLst>
-            <a:ext uri="{909E8E84-426E-40DD-AFC4-6F175D3DCCD1}">
-              <a14:hiddenFill xmlns:a14="http://schemas.microsoft.com/office/drawing/2010/main">
-                <a:solidFill>
-                  <a:srgbClr val="FFFFFF"/>
-                </a:solidFill>
-              </a14:hiddenFill>
-            </a:ext>
-          </a:extLst>
         </p:spPr>
       </p:pic>
       <p:pic>
@@ -13109,8 +13681,8 @@
 </p:sld>
 </file>
 
-<file path=ppt/slides/slide6.xml><?xml version="1.0" encoding="utf-8"?>
-<p:sld xmlns:a="http://schemas.openxmlformats.org/drawingml/2006/main" xmlns:r="http://schemas.openxmlformats.org/officeDocument/2006/relationships" xmlns:p="http://schemas.openxmlformats.org/presentationml/2006/main">
+<file path=ppt/slides/slide7.xml><?xml version="1.0" encoding="utf-8"?>
+<p:sld xmlns:a="http://schemas.openxmlformats.org/drawingml/2006/main" xmlns:r="http://schemas.openxmlformats.org/officeDocument/2006/relationships" xmlns:p="http://schemas.openxmlformats.org/presentationml/2006/main" show="0">
   <p:cSld>
     <p:spTree>
       <p:nvGrpSpPr>
@@ -13461,7 +14033,7 @@
 </p:sld>
 </file>
 
-<file path=ppt/slides/slide7.xml><?xml version="1.0" encoding="utf-8"?>
+<file path=ppt/slides/slide8.xml><?xml version="1.0" encoding="utf-8"?>
 <p:sld xmlns:a="http://schemas.openxmlformats.org/drawingml/2006/main" xmlns:r="http://schemas.openxmlformats.org/officeDocument/2006/relationships" xmlns:p="http://schemas.openxmlformats.org/presentationml/2006/main">
   <p:cSld>
     <p:spTree>
@@ -13681,7 +14253,7 @@
 </p:sld>
 </file>
 
-<file path=ppt/slides/slide8.xml><?xml version="1.0" encoding="utf-8"?>
+<file path=ppt/slides/slide9.xml><?xml version="1.0" encoding="utf-8"?>
 <p:sld xmlns:a="http://schemas.openxmlformats.org/drawingml/2006/main" xmlns:r="http://schemas.openxmlformats.org/officeDocument/2006/relationships" xmlns:p="http://schemas.openxmlformats.org/presentationml/2006/main">
   <p:cSld>
     <p:spTree>
@@ -13934,467 +14506,6 @@
     <p:extLst>
       <p:ext uri="{BB962C8B-B14F-4D97-AF65-F5344CB8AC3E}">
         <p14:creationId xmlns:p14="http://schemas.microsoft.com/office/powerpoint/2010/main" val="4197870534"/>
-      </p:ext>
-    </p:extLst>
-  </p:cSld>
-  <p:clrMapOvr>
-    <a:masterClrMapping/>
-  </p:clrMapOvr>
-</p:sld>
-</file>
-
-<file path=ppt/slides/slide9.xml><?xml version="1.0" encoding="utf-8"?>
-<p:sld xmlns:a="http://schemas.openxmlformats.org/drawingml/2006/main" xmlns:r="http://schemas.openxmlformats.org/officeDocument/2006/relationships" xmlns:p="http://schemas.openxmlformats.org/presentationml/2006/main">
-  <p:cSld>
-    <p:spTree>
-      <p:nvGrpSpPr>
-        <p:cNvPr id="1" name=""/>
-        <p:cNvGrpSpPr/>
-        <p:nvPr/>
-      </p:nvGrpSpPr>
-      <p:grpSpPr>
-        <a:xfrm>
-          <a:off x="0" y="0"/>
-          <a:ext cx="0" cy="0"/>
-          <a:chOff x="0" y="0"/>
-          <a:chExt cx="0" cy="0"/>
-        </a:xfrm>
-      </p:grpSpPr>
-      <p:sp>
-        <p:nvSpPr>
-          <p:cNvPr id="2" name="Titel 1">
-            <a:extLst>
-              <a:ext uri="{FF2B5EF4-FFF2-40B4-BE49-F238E27FC236}">
-                <a16:creationId xmlns:a16="http://schemas.microsoft.com/office/drawing/2014/main" id="{9014DB0E-06FC-4867-2980-06B8D2A7B370}"/>
-              </a:ext>
-            </a:extLst>
-          </p:cNvPr>
-          <p:cNvSpPr>
-            <a:spLocks noGrp="1"/>
-          </p:cNvSpPr>
-          <p:nvPr>
-            <p:ph type="title"/>
-          </p:nvPr>
-        </p:nvSpPr>
-        <p:spPr/>
-        <p:txBody>
-          <a:bodyPr/>
-          <a:lstStyle/>
-          <a:p>
-            <a:r>
-              <a:rPr lang="de-CH" dirty="0"/>
-              <a:t>Codeeinblick</a:t>
-            </a:r>
-          </a:p>
-        </p:txBody>
-      </p:sp>
-      <p:sp>
-        <p:nvSpPr>
-          <p:cNvPr id="4" name="Inhaltsplatzhalter 3">
-            <a:extLst>
-              <a:ext uri="{FF2B5EF4-FFF2-40B4-BE49-F238E27FC236}">
-                <a16:creationId xmlns:a16="http://schemas.microsoft.com/office/drawing/2014/main" id="{165A2B93-BEEA-466A-20FD-7A4A442F3A83}"/>
-              </a:ext>
-            </a:extLst>
-          </p:cNvPr>
-          <p:cNvSpPr>
-            <a:spLocks noGrp="1"/>
-          </p:cNvSpPr>
-          <p:nvPr>
-            <p:ph sz="quarter" idx="14"/>
-          </p:nvPr>
-        </p:nvSpPr>
-        <p:spPr>
-          <a:xfrm>
-            <a:off x="3451860" y="1772725"/>
-            <a:ext cx="5676900" cy="3597470"/>
-          </a:xfrm>
-        </p:spPr>
-        <p:txBody>
-          <a:bodyPr>
-            <a:normAutofit/>
-          </a:bodyPr>
-          <a:lstStyle/>
-          <a:p>
-            <a:pPr marL="0" indent="0">
-              <a:buNone/>
-            </a:pPr>
-            <a:r>
-              <a:rPr lang="de-CH" sz="2800" b="1" dirty="0"/>
-              <a:t>Rätsel-Aufbereitung &amp; Rückgabe </a:t>
-            </a:r>
-          </a:p>
-        </p:txBody>
-      </p:sp>
-      <p:sp>
-        <p:nvSpPr>
-          <p:cNvPr id="11" name="Textfeld 10">
-            <a:extLst>
-              <a:ext uri="{FF2B5EF4-FFF2-40B4-BE49-F238E27FC236}">
-                <a16:creationId xmlns:a16="http://schemas.microsoft.com/office/drawing/2014/main" id="{33EEDF6A-8FB7-3E15-ACE7-660A306B6656}"/>
-              </a:ext>
-            </a:extLst>
-          </p:cNvPr>
-          <p:cNvSpPr txBox="1"/>
-          <p:nvPr/>
-        </p:nvSpPr>
-        <p:spPr>
-          <a:xfrm>
-            <a:off x="6849009" y="2587779"/>
-            <a:ext cx="4358640" cy="3770263"/>
-          </a:xfrm>
-          <a:prstGeom prst="rect">
-            <a:avLst/>
-          </a:prstGeom>
-          <a:noFill/>
-        </p:spPr>
-        <p:txBody>
-          <a:bodyPr wrap="square" rtlCol="0">
-            <a:spAutoFit/>
-          </a:bodyPr>
-          <a:lstStyle/>
-          <a:p>
-            <a:pPr marL="0" marR="0" lvl="0" indent="0" algn="l" defTabSz="914400" rtl="0" eaLnBrk="0" fontAlgn="base" latinLnBrk="0" hangingPunct="0">
-              <a:lnSpc>
-                <a:spcPct val="100000"/>
-              </a:lnSpc>
-              <a:spcBef>
-                <a:spcPct val="0"/>
-              </a:spcBef>
-              <a:spcAft>
-                <a:spcPct val="0"/>
-              </a:spcAft>
-              <a:buClrTx/>
-              <a:buSzTx/>
-              <a:tabLst/>
-            </a:pPr>
-            <a:r>
-              <a:rPr kumimoji="0" lang="de-DE" altLang="de-DE" sz="1500" b="1" i="0" u="none" strike="noStrike" cap="none" normalizeH="0" baseline="0" dirty="0">
-                <a:ln>
-                  <a:noFill/>
-                </a:ln>
-                <a:solidFill>
-                  <a:schemeClr val="bg1"/>
-                </a:solidFill>
-                <a:effectLst/>
-                <a:latin typeface="Arial" panose="020B0604020202020204" pitchFamily="34" charset="0"/>
-              </a:rPr>
-              <a:t>Klarheit &amp; Wartbarkeit</a:t>
-            </a:r>
-            <a:r>
-              <a:rPr kumimoji="0" lang="de-DE" altLang="de-DE" sz="1500" b="0" i="0" u="none" strike="noStrike" cap="none" normalizeH="0" baseline="0" dirty="0">
-                <a:ln>
-                  <a:noFill/>
-                </a:ln>
-                <a:solidFill>
-                  <a:schemeClr val="bg1"/>
-                </a:solidFill>
-                <a:effectLst/>
-                <a:latin typeface="Arial" panose="020B0604020202020204" pitchFamily="34" charset="0"/>
-              </a:rPr>
-              <a:t>: Jede Rätsel-Kategorie wird separat und eindeutig behandelt – neue Typen lassen sich so einfach ergänzen.</a:t>
-            </a:r>
-            <a:br>
-              <a:rPr kumimoji="0" lang="de-DE" altLang="de-DE" sz="1500" b="0" i="0" u="none" strike="noStrike" cap="none" normalizeH="0" baseline="0" dirty="0">
-                <a:ln>
-                  <a:noFill/>
-                </a:ln>
-                <a:solidFill>
-                  <a:schemeClr val="bg1"/>
-                </a:solidFill>
-                <a:effectLst/>
-                <a:latin typeface="Arial" panose="020B0604020202020204" pitchFamily="34" charset="0"/>
-              </a:rPr>
-            </a:br>
-            <a:endParaRPr kumimoji="0" lang="de-DE" altLang="de-DE" sz="1500" b="0" i="0" u="none" strike="noStrike" cap="none" normalizeH="0" baseline="0" dirty="0">
-              <a:ln>
-                <a:noFill/>
-              </a:ln>
-              <a:solidFill>
-                <a:schemeClr val="bg1"/>
-              </a:solidFill>
-              <a:effectLst/>
-              <a:latin typeface="Arial" panose="020B0604020202020204" pitchFamily="34" charset="0"/>
-            </a:endParaRPr>
-          </a:p>
-          <a:p>
-            <a:pPr marL="0" marR="0" lvl="0" indent="0" algn="l" defTabSz="914400" rtl="0" eaLnBrk="0" fontAlgn="base" latinLnBrk="0" hangingPunct="0">
-              <a:lnSpc>
-                <a:spcPct val="100000"/>
-              </a:lnSpc>
-              <a:spcBef>
-                <a:spcPct val="0"/>
-              </a:spcBef>
-              <a:spcAft>
-                <a:spcPct val="0"/>
-              </a:spcAft>
-              <a:buClrTx/>
-              <a:buSzTx/>
-              <a:tabLst/>
-            </a:pPr>
-            <a:r>
-              <a:rPr kumimoji="0" lang="de-DE" altLang="de-DE" sz="1500" b="1" i="0" u="none" strike="noStrike" cap="none" normalizeH="0" baseline="0" dirty="0">
-                <a:ln>
-                  <a:noFill/>
-                </a:ln>
-                <a:solidFill>
-                  <a:schemeClr val="bg1"/>
-                </a:solidFill>
-                <a:effectLst/>
-                <a:latin typeface="Arial" panose="020B0604020202020204" pitchFamily="34" charset="0"/>
-              </a:rPr>
-              <a:t>Robustheit</a:t>
-            </a:r>
-            <a:r>
-              <a:rPr kumimoji="0" lang="de-DE" altLang="de-DE" sz="1500" b="0" i="0" u="none" strike="noStrike" cap="none" normalizeH="0" baseline="0" dirty="0">
-                <a:ln>
-                  <a:noFill/>
-                </a:ln>
-                <a:solidFill>
-                  <a:schemeClr val="bg1"/>
-                </a:solidFill>
-                <a:effectLst/>
-                <a:latin typeface="Arial" panose="020B0604020202020204" pitchFamily="34" charset="0"/>
-              </a:rPr>
-              <a:t>: Fehlende oder unbekannte Typen führen nicht zu Abstürzen, sondern landen im </a:t>
-            </a:r>
-            <a:r>
-              <a:rPr kumimoji="0" lang="de-DE" altLang="de-DE" sz="1500" b="0" i="0" u="none" strike="noStrike" cap="none" normalizeH="0" baseline="0" dirty="0" err="1">
-                <a:ln>
-                  <a:noFill/>
-                </a:ln>
-                <a:solidFill>
-                  <a:schemeClr val="bg1"/>
-                </a:solidFill>
-                <a:effectLst/>
-                <a:latin typeface="Arial" panose="020B0604020202020204" pitchFamily="34" charset="0"/>
-              </a:rPr>
-              <a:t>Fallback</a:t>
-            </a:r>
-            <a:r>
-              <a:rPr kumimoji="0" lang="de-DE" altLang="de-DE" sz="1500" b="0" i="0" u="none" strike="noStrike" cap="none" normalizeH="0" baseline="0" dirty="0">
-                <a:ln>
-                  <a:noFill/>
-                </a:ln>
-                <a:solidFill>
-                  <a:schemeClr val="bg1"/>
-                </a:solidFill>
-                <a:effectLst/>
-                <a:latin typeface="Arial" panose="020B0604020202020204" pitchFamily="34" charset="0"/>
-              </a:rPr>
-              <a:t>.</a:t>
-            </a:r>
-          </a:p>
-          <a:p>
-            <a:pPr marL="0" marR="0" lvl="0" indent="0" algn="l" defTabSz="914400" rtl="0" eaLnBrk="0" fontAlgn="base" latinLnBrk="0" hangingPunct="0">
-              <a:lnSpc>
-                <a:spcPct val="100000"/>
-              </a:lnSpc>
-              <a:spcBef>
-                <a:spcPct val="0"/>
-              </a:spcBef>
-              <a:spcAft>
-                <a:spcPct val="0"/>
-              </a:spcAft>
-              <a:buClrTx/>
-              <a:buSzTx/>
-              <a:tabLst/>
-            </a:pPr>
-            <a:endParaRPr kumimoji="0" lang="de-DE" altLang="de-DE" sz="1500" b="1" i="0" u="none" strike="noStrike" cap="none" normalizeH="0" baseline="0" dirty="0">
-              <a:ln>
-                <a:noFill/>
-              </a:ln>
-              <a:solidFill>
-                <a:schemeClr val="bg1"/>
-              </a:solidFill>
-              <a:effectLst/>
-              <a:latin typeface="Arial" panose="020B0604020202020204" pitchFamily="34" charset="0"/>
-            </a:endParaRPr>
-          </a:p>
-          <a:p>
-            <a:pPr marL="0" marR="0" lvl="0" indent="0" algn="l" defTabSz="914400" rtl="0" eaLnBrk="0" fontAlgn="base" latinLnBrk="0" hangingPunct="0">
-              <a:lnSpc>
-                <a:spcPct val="100000"/>
-              </a:lnSpc>
-              <a:spcBef>
-                <a:spcPct val="0"/>
-              </a:spcBef>
-              <a:spcAft>
-                <a:spcPct val="0"/>
-              </a:spcAft>
-              <a:buClrTx/>
-              <a:buSzTx/>
-              <a:tabLst/>
-            </a:pPr>
-            <a:r>
-              <a:rPr kumimoji="0" lang="de-DE" altLang="de-DE" sz="1500" b="1" i="0" u="none" strike="noStrike" cap="none" normalizeH="0" baseline="0" dirty="0">
-                <a:ln>
-                  <a:noFill/>
-                </a:ln>
-                <a:solidFill>
-                  <a:schemeClr val="bg1"/>
-                </a:solidFill>
-                <a:effectLst/>
-                <a:latin typeface="Arial" panose="020B0604020202020204" pitchFamily="34" charset="0"/>
-              </a:rPr>
-              <a:t>Spielerfahrung</a:t>
-            </a:r>
-            <a:r>
-              <a:rPr kumimoji="0" lang="de-DE" altLang="de-DE" sz="1500" b="0" i="0" u="none" strike="noStrike" cap="none" normalizeH="0" baseline="0" dirty="0">
-                <a:ln>
-                  <a:noFill/>
-                </a:ln>
-                <a:solidFill>
-                  <a:schemeClr val="bg1"/>
-                </a:solidFill>
-                <a:effectLst/>
-                <a:latin typeface="Arial" panose="020B0604020202020204" pitchFamily="34" charset="0"/>
-              </a:rPr>
-              <a:t>: Einheitliches Format für Frage, Antwort und Tipp garantiert konsistente Anzeige im Terminal und vermeidet Verwirrung.</a:t>
-            </a:r>
-          </a:p>
-          <a:p>
-            <a:pPr marL="0" marR="0" lvl="0" indent="0" algn="l" defTabSz="914400" rtl="0" eaLnBrk="0" fontAlgn="base" latinLnBrk="0" hangingPunct="0">
-              <a:lnSpc>
-                <a:spcPct val="100000"/>
-              </a:lnSpc>
-              <a:spcBef>
-                <a:spcPct val="0"/>
-              </a:spcBef>
-              <a:spcAft>
-                <a:spcPct val="0"/>
-              </a:spcAft>
-              <a:buClrTx/>
-              <a:buSzTx/>
-              <a:tabLst/>
-            </a:pPr>
-            <a:endParaRPr kumimoji="0" lang="de-DE" altLang="de-DE" sz="1500" b="1" i="0" u="none" strike="noStrike" cap="none" normalizeH="0" baseline="0" dirty="0">
-              <a:ln>
-                <a:noFill/>
-              </a:ln>
-              <a:solidFill>
-                <a:schemeClr val="bg1"/>
-              </a:solidFill>
-              <a:effectLst/>
-              <a:latin typeface="Arial" panose="020B0604020202020204" pitchFamily="34" charset="0"/>
-            </a:endParaRPr>
-          </a:p>
-          <a:p>
-            <a:pPr marL="0" marR="0" lvl="0" indent="0" algn="l" defTabSz="914400" rtl="0" eaLnBrk="0" fontAlgn="base" latinLnBrk="0" hangingPunct="0">
-              <a:lnSpc>
-                <a:spcPct val="100000"/>
-              </a:lnSpc>
-              <a:spcBef>
-                <a:spcPct val="0"/>
-              </a:spcBef>
-              <a:spcAft>
-                <a:spcPct val="0"/>
-              </a:spcAft>
-              <a:buClrTx/>
-              <a:buSzTx/>
-              <a:tabLst/>
-            </a:pPr>
-            <a:r>
-              <a:rPr kumimoji="0" lang="de-DE" altLang="de-DE" sz="1500" b="1" i="0" u="none" strike="noStrike" cap="none" normalizeH="0" baseline="0" dirty="0">
-                <a:ln>
-                  <a:noFill/>
-                </a:ln>
-                <a:solidFill>
-                  <a:schemeClr val="bg1"/>
-                </a:solidFill>
-                <a:effectLst/>
-                <a:latin typeface="Arial" panose="020B0604020202020204" pitchFamily="34" charset="0"/>
-              </a:rPr>
-              <a:t>Erweiterbarkeit</a:t>
-            </a:r>
-            <a:r>
-              <a:rPr kumimoji="0" lang="de-DE" altLang="de-DE" sz="1500" b="0" i="0" u="none" strike="noStrike" cap="none" normalizeH="0" baseline="0" dirty="0">
-                <a:ln>
-                  <a:noFill/>
-                </a:ln>
-                <a:solidFill>
-                  <a:schemeClr val="bg1"/>
-                </a:solidFill>
-                <a:effectLst/>
-                <a:latin typeface="Arial" panose="020B0604020202020204" pitchFamily="34" charset="0"/>
-              </a:rPr>
-              <a:t>: Zusätzliche Rätsel-Typen können einfach über neue </a:t>
-            </a:r>
-            <a:r>
-              <a:rPr kumimoji="0" lang="de-DE" altLang="de-DE" sz="1500" b="0" i="0" u="none" strike="noStrike" cap="none" normalizeH="0" baseline="0" dirty="0" err="1">
-                <a:ln>
-                  <a:noFill/>
-                </a:ln>
-                <a:solidFill>
-                  <a:schemeClr val="bg1"/>
-                </a:solidFill>
-                <a:effectLst/>
-                <a:latin typeface="Arial Unicode MS"/>
-              </a:rPr>
-              <a:t>elif</a:t>
-            </a:r>
-            <a:r>
-              <a:rPr kumimoji="0" lang="de-DE" altLang="de-DE" sz="1500" b="0" i="0" u="none" strike="noStrike" cap="none" normalizeH="0" baseline="0" dirty="0">
-                <a:ln>
-                  <a:noFill/>
-                </a:ln>
-                <a:solidFill>
-                  <a:schemeClr val="bg1"/>
-                </a:solidFill>
-                <a:effectLst/>
-              </a:rPr>
-              <a:t>-Blöcke ergänzt werden, ohne bestehende Logik zu ändern.</a:t>
-            </a:r>
-            <a:endParaRPr kumimoji="0" lang="de-DE" altLang="de-DE" sz="1500" b="0" i="0" u="none" strike="noStrike" cap="none" normalizeH="0" baseline="0" dirty="0">
-              <a:ln>
-                <a:noFill/>
-              </a:ln>
-              <a:solidFill>
-                <a:schemeClr val="bg1"/>
-              </a:solidFill>
-              <a:effectLst/>
-              <a:latin typeface="Arial" panose="020B0604020202020204" pitchFamily="34" charset="0"/>
-            </a:endParaRPr>
-          </a:p>
-          <a:p>
-            <a:endParaRPr lang="de-CH" sz="1400" dirty="0"/>
-          </a:p>
-        </p:txBody>
-      </p:sp>
-      <p:pic>
-        <p:nvPicPr>
-          <p:cNvPr id="5" name="Grafik 4">
-            <a:extLst>
-              <a:ext uri="{FF2B5EF4-FFF2-40B4-BE49-F238E27FC236}">
-                <a16:creationId xmlns:a16="http://schemas.microsoft.com/office/drawing/2014/main" id="{684FC139-B889-19BA-F299-AEFFF7550D7B}"/>
-              </a:ext>
-            </a:extLst>
-          </p:cNvPr>
-          <p:cNvPicPr>
-            <a:picLocks noChangeAspect="1"/>
-          </p:cNvPicPr>
-          <p:nvPr/>
-        </p:nvPicPr>
-        <p:blipFill>
-          <a:blip r:embed="rId3"/>
-          <a:stretch>
-            <a:fillRect/>
-          </a:stretch>
-        </p:blipFill>
-        <p:spPr>
-          <a:xfrm>
-            <a:off x="572928" y="2626252"/>
-            <a:ext cx="5757864" cy="3693319"/>
-          </a:xfrm>
-          <a:prstGeom prst="rect">
-            <a:avLst/>
-          </a:prstGeom>
-        </p:spPr>
-      </p:pic>
-    </p:spTree>
-    <p:extLst>
-      <p:ext uri="{BB962C8B-B14F-4D97-AF65-F5344CB8AC3E}">
-        <p14:creationId xmlns:p14="http://schemas.microsoft.com/office/powerpoint/2010/main" val="93615151"/>
       </p:ext>
     </p:extLst>
   </p:cSld>
@@ -15196,23 +15307,12 @@
 </file>
 
 <file path=customXml/item1.xml><?xml version="1.0" encoding="utf-8"?>
-<p:properties xmlns:p="http://schemas.microsoft.com/office/2006/metadata/properties" xmlns:xsi="http://www.w3.org/2001/XMLSchema-instance" xmlns:pc="http://schemas.microsoft.com/office/infopath/2007/PartnerControls">
-  <documentManagement>
-    <Background xmlns="71af3243-3dd4-4a8d-8c0d-dd76da1f02a5">false</Background>
-    <Status xmlns="71af3243-3dd4-4a8d-8c0d-dd76da1f02a5">Not started</Status>
-    <_ip_UnifiedCompliancePolicyUIAction xmlns="http://schemas.microsoft.com/sharepoint/v3" xsi:nil="true"/>
-    <Image xmlns="71af3243-3dd4-4a8d-8c0d-dd76da1f02a5">
-      <Url xsi:nil="true"/>
-      <Description xsi:nil="true"/>
-    </Image>
-    <_ip_UnifiedCompliancePolicyProperties xmlns="http://schemas.microsoft.com/sharepoint/v3" xsi:nil="true"/>
-    <ImageTagsTaxHTField xmlns="71af3243-3dd4-4a8d-8c0d-dd76da1f02a5">
-      <Terms xmlns="http://schemas.microsoft.com/office/infopath/2007/PartnerControls"/>
-    </ImageTagsTaxHTField>
-    <TaxCatchAll xmlns="230e9df3-be65-4c73-a93b-d1236ebd677e" xsi:nil="true"/>
-    <MediaServiceKeyPoints xmlns="71af3243-3dd4-4a8d-8c0d-dd76da1f02a5" xsi:nil="true"/>
-  </documentManagement>
-</p:properties>
+<?mso-contentType ?>
+<FormTemplates xmlns="http://schemas.microsoft.com/sharepoint/v3/contenttype/forms">
+  <Display>DocumentLibraryForm</Display>
+  <Edit>DocumentLibraryForm</Edit>
+  <New>DocumentLibraryForm</New>
+</FormTemplates>
 </file>
 
 <file path=customXml/item2.xml><?xml version="1.0" encoding="utf-8"?>
@@ -15528,22 +15628,29 @@
 </file>
 
 <file path=customXml/item3.xml><?xml version="1.0" encoding="utf-8"?>
-<?mso-contentType ?>
-<FormTemplates xmlns="http://schemas.microsoft.com/sharepoint/v3/contenttype/forms">
-  <Display>DocumentLibraryForm</Display>
-  <Edit>DocumentLibraryForm</Edit>
-  <New>DocumentLibraryForm</New>
-</FormTemplates>
+<p:properties xmlns:p="http://schemas.microsoft.com/office/2006/metadata/properties" xmlns:xsi="http://www.w3.org/2001/XMLSchema-instance" xmlns:pc="http://schemas.microsoft.com/office/infopath/2007/PartnerControls">
+  <documentManagement>
+    <Background xmlns="71af3243-3dd4-4a8d-8c0d-dd76da1f02a5">false</Background>
+    <Status xmlns="71af3243-3dd4-4a8d-8c0d-dd76da1f02a5">Not started</Status>
+    <_ip_UnifiedCompliancePolicyUIAction xmlns="http://schemas.microsoft.com/sharepoint/v3" xsi:nil="true"/>
+    <Image xmlns="71af3243-3dd4-4a8d-8c0d-dd76da1f02a5">
+      <Url xsi:nil="true"/>
+      <Description xsi:nil="true"/>
+    </Image>
+    <_ip_UnifiedCompliancePolicyProperties xmlns="http://schemas.microsoft.com/sharepoint/v3" xsi:nil="true"/>
+    <ImageTagsTaxHTField xmlns="71af3243-3dd4-4a8d-8c0d-dd76da1f02a5">
+      <Terms xmlns="http://schemas.microsoft.com/office/infopath/2007/PartnerControls"/>
+    </ImageTagsTaxHTField>
+    <TaxCatchAll xmlns="230e9df3-be65-4c73-a93b-d1236ebd677e" xsi:nil="true"/>
+    <MediaServiceKeyPoints xmlns="71af3243-3dd4-4a8d-8c0d-dd76da1f02a5" xsi:nil="true"/>
+  </documentManagement>
+</p:properties>
 </file>
 
 <file path=customXml/itemProps1.xml><?xml version="1.0" encoding="utf-8"?>
-<ds:datastoreItem xmlns:ds="http://schemas.openxmlformats.org/officeDocument/2006/customXml" ds:itemID="{4F4B194E-8B30-4377-8C59-ECFB902D2A26}">
+<ds:datastoreItem xmlns:ds="http://schemas.openxmlformats.org/officeDocument/2006/customXml" ds:itemID="{C21FFAC0-05A2-416A-B06C-C248395482CF}">
   <ds:schemaRefs>
-    <ds:schemaRef ds:uri="http://schemas.microsoft.com/office/2006/metadata/properties"/>
-    <ds:schemaRef ds:uri="http://schemas.microsoft.com/office/infopath/2007/PartnerControls"/>
-    <ds:schemaRef ds:uri="71af3243-3dd4-4a8d-8c0d-dd76da1f02a5"/>
-    <ds:schemaRef ds:uri="http://schemas.microsoft.com/sharepoint/v3"/>
-    <ds:schemaRef ds:uri="230e9df3-be65-4c73-a93b-d1236ebd677e"/>
+    <ds:schemaRef ds:uri="http://schemas.microsoft.com/sharepoint/v3/contenttype/forms"/>
   </ds:schemaRefs>
 </ds:datastoreItem>
 </file>
@@ -15570,9 +15677,13 @@
 </file>
 
 <file path=customXml/itemProps3.xml><?xml version="1.0" encoding="utf-8"?>
-<ds:datastoreItem xmlns:ds="http://schemas.openxmlformats.org/officeDocument/2006/customXml" ds:itemID="{C21FFAC0-05A2-416A-B06C-C248395482CF}">
+<ds:datastoreItem xmlns:ds="http://schemas.openxmlformats.org/officeDocument/2006/customXml" ds:itemID="{4F4B194E-8B30-4377-8C59-ECFB902D2A26}">
   <ds:schemaRefs>
-    <ds:schemaRef ds:uri="http://schemas.microsoft.com/sharepoint/v3/contenttype/forms"/>
+    <ds:schemaRef ds:uri="http://schemas.microsoft.com/office/2006/metadata/properties"/>
+    <ds:schemaRef ds:uri="http://schemas.microsoft.com/office/infopath/2007/PartnerControls"/>
+    <ds:schemaRef ds:uri="71af3243-3dd4-4a8d-8c0d-dd76da1f02a5"/>
+    <ds:schemaRef ds:uri="http://schemas.microsoft.com/sharepoint/v3"/>
+    <ds:schemaRef ds:uri="230e9df3-be65-4c73-a93b-d1236ebd677e"/>
   </ds:schemaRefs>
 </ds:datastoreItem>
 </file>

</xml_diff>